<commit_message>
Modification de ma partie de l'oral
</commit_message>
<xml_diff>
--- a/Documentations/RemiseMiSession/Presentation_alexandre.pptx
+++ b/Documentations/RemiseMiSession/Presentation_alexandre.pptx
@@ -6491,6 +6491,18 @@
               <a:rPr lang="fr-CA" dirty="0" smtClean="0"/>
               <a:t>Tests facilitent la gestion de risques </a:t>
             </a:r>
+            <a:endParaRPr lang="fr-CA" dirty="0" smtClean="0"/>
+          </a:p>
+          <a:p>
+            <a:r>
+              <a:rPr lang="fr-CA" dirty="0"/>
+              <a:t>Tests importants : déploiement, jouabilité, haut </a:t>
+            </a:r>
+            <a:r>
+              <a:rPr lang="fr-CA" dirty="0" smtClean="0"/>
+              <a:t>niveau</a:t>
+            </a:r>
+            <a:endParaRPr lang="fr-CA" dirty="0" smtClean="0"/>
           </a:p>
           <a:p>
             <a:r>
@@ -6508,12 +6520,6 @@
             <a:r>
               <a:rPr lang="fr-CA" dirty="0" smtClean="0"/>
               <a:t>Phase de prototype et de développement clairement séparées</a:t>
-            </a:r>
-          </a:p>
-          <a:p>
-            <a:r>
-              <a:rPr lang="fr-CA" dirty="0" smtClean="0"/>
-              <a:t>Tests importants : déploiement, jouabilité, haut niveau</a:t>
             </a:r>
           </a:p>
           <a:p>
@@ -6592,6 +6598,9 @@
           <a:bodyPr/>
           <a:lstStyle/>
           <a:p>
+            <a:endParaRPr lang="fr-CA" dirty="0" smtClean="0"/>
+          </a:p>
+          <a:p>
             <a:r>
               <a:rPr lang="fr-CA" dirty="0" smtClean="0"/>
               <a:t>Échéancier pessimiste pour mieux gérer le risque</a:t>
@@ -6600,7 +6609,7 @@
           <a:p>
             <a:r>
               <a:rPr lang="fr-CA" dirty="0" smtClean="0"/>
-              <a:t>Phase de prototypage relativement longue</a:t>
+              <a:t>Phase de prototypage relativement longue (près d’un mois)</a:t>
             </a:r>
           </a:p>
           <a:p>
@@ -6612,7 +6621,7 @@
           <a:p>
             <a:r>
               <a:rPr lang="fr-CA" dirty="0" smtClean="0"/>
-              <a:t>Phase de test et d’amélioration</a:t>
+              <a:t>Phase de test et d’amélioration (10 mars)</a:t>
             </a:r>
           </a:p>
           <a:p>
@@ -6629,6 +6638,12 @@
             <a:r>
               <a:rPr lang="fr-CA" dirty="0" smtClean="0"/>
               <a:t>Échéancier et requis flexibles afin de mieux réagir aux imprévus</a:t>
+            </a:r>
+          </a:p>
+          <a:p>
+            <a:r>
+              <a:rPr lang="fr-CA" dirty="0" smtClean="0"/>
+              <a:t>Phase de développement du 24 février au 10 mars</a:t>
             </a:r>
           </a:p>
           <a:p>

</xml_diff>